<commit_message>
structural changes and new graph
</commit_message>
<xml_diff>
--- a/causalgraphs.pptx
+++ b/causalgraphs.pptx
@@ -6,8 +6,9 @@
   </p:sldMasterIdLst>
   <p:sldIdLst>
     <p:sldId id="257" r:id="rId2"/>
-    <p:sldId id="258" r:id="rId3"/>
-    <p:sldId id="260" r:id="rId4"/>
+    <p:sldId id="261" r:id="rId3"/>
+    <p:sldId id="258" r:id="rId4"/>
+    <p:sldId id="260" r:id="rId5"/>
   </p:sldIdLst>
   <p:sldSz cx="12192000" cy="14400213"/>
   <p:notesSz cx="6858000" cy="9144000"/>
@@ -245,7 +246,7 @@
           <a:p>
             <a:fld id="{0242246C-62F8-8D41-AE20-12536F7DA5C0}" type="datetimeFigureOut">
               <a:rPr lang="en-US" smtClean="0"/>
-              <a:t>5/9/22</a:t>
+              <a:t>5/13/22</a:t>
             </a:fld>
             <a:endParaRPr lang="en-US"/>
           </a:p>
@@ -415,7 +416,7 @@
           <a:p>
             <a:fld id="{0242246C-62F8-8D41-AE20-12536F7DA5C0}" type="datetimeFigureOut">
               <a:rPr lang="en-US" smtClean="0"/>
-              <a:t>5/9/22</a:t>
+              <a:t>5/13/22</a:t>
             </a:fld>
             <a:endParaRPr lang="en-US"/>
           </a:p>
@@ -595,7 +596,7 @@
           <a:p>
             <a:fld id="{0242246C-62F8-8D41-AE20-12536F7DA5C0}" type="datetimeFigureOut">
               <a:rPr lang="en-US" smtClean="0"/>
-              <a:t>5/9/22</a:t>
+              <a:t>5/13/22</a:t>
             </a:fld>
             <a:endParaRPr lang="en-US"/>
           </a:p>
@@ -765,7 +766,7 @@
           <a:p>
             <a:fld id="{0242246C-62F8-8D41-AE20-12536F7DA5C0}" type="datetimeFigureOut">
               <a:rPr lang="en-US" smtClean="0"/>
-              <a:t>5/9/22</a:t>
+              <a:t>5/13/22</a:t>
             </a:fld>
             <a:endParaRPr lang="en-US"/>
           </a:p>
@@ -1009,7 +1010,7 @@
           <a:p>
             <a:fld id="{0242246C-62F8-8D41-AE20-12536F7DA5C0}" type="datetimeFigureOut">
               <a:rPr lang="en-US" smtClean="0"/>
-              <a:t>5/9/22</a:t>
+              <a:t>5/13/22</a:t>
             </a:fld>
             <a:endParaRPr lang="en-US"/>
           </a:p>
@@ -1241,7 +1242,7 @@
           <a:p>
             <a:fld id="{0242246C-62F8-8D41-AE20-12536F7DA5C0}" type="datetimeFigureOut">
               <a:rPr lang="en-US" smtClean="0"/>
-              <a:t>5/9/22</a:t>
+              <a:t>5/13/22</a:t>
             </a:fld>
             <a:endParaRPr lang="en-US"/>
           </a:p>
@@ -1608,7 +1609,7 @@
           <a:p>
             <a:fld id="{0242246C-62F8-8D41-AE20-12536F7DA5C0}" type="datetimeFigureOut">
               <a:rPr lang="en-US" smtClean="0"/>
-              <a:t>5/9/22</a:t>
+              <a:t>5/13/22</a:t>
             </a:fld>
             <a:endParaRPr lang="en-US"/>
           </a:p>
@@ -1726,7 +1727,7 @@
           <a:p>
             <a:fld id="{0242246C-62F8-8D41-AE20-12536F7DA5C0}" type="datetimeFigureOut">
               <a:rPr lang="en-US" smtClean="0"/>
-              <a:t>5/9/22</a:t>
+              <a:t>5/13/22</a:t>
             </a:fld>
             <a:endParaRPr lang="en-US"/>
           </a:p>
@@ -1821,7 +1822,7 @@
           <a:p>
             <a:fld id="{0242246C-62F8-8D41-AE20-12536F7DA5C0}" type="datetimeFigureOut">
               <a:rPr lang="en-US" smtClean="0"/>
-              <a:t>5/9/22</a:t>
+              <a:t>5/13/22</a:t>
             </a:fld>
             <a:endParaRPr lang="en-US"/>
           </a:p>
@@ -2098,7 +2099,7 @@
           <a:p>
             <a:fld id="{0242246C-62F8-8D41-AE20-12536F7DA5C0}" type="datetimeFigureOut">
               <a:rPr lang="en-US" smtClean="0"/>
-              <a:t>5/9/22</a:t>
+              <a:t>5/13/22</a:t>
             </a:fld>
             <a:endParaRPr lang="en-US"/>
           </a:p>
@@ -2355,7 +2356,7 @@
           <a:p>
             <a:fld id="{0242246C-62F8-8D41-AE20-12536F7DA5C0}" type="datetimeFigureOut">
               <a:rPr lang="en-US" smtClean="0"/>
-              <a:t>5/9/22</a:t>
+              <a:t>5/13/22</a:t>
             </a:fld>
             <a:endParaRPr lang="en-US"/>
           </a:p>
@@ -2568,7 +2569,7 @@
           <a:p>
             <a:fld id="{0242246C-62F8-8D41-AE20-12536F7DA5C0}" type="datetimeFigureOut">
               <a:rPr lang="en-US" smtClean="0"/>
-              <a:t>5/9/22</a:t>
+              <a:t>5/13/22</a:t>
             </a:fld>
             <a:endParaRPr lang="en-US"/>
           </a:p>
@@ -4390,6 +4391,795 @@
       </p:grpSpPr>
       <p:grpSp>
         <p:nvGrpSpPr>
+          <p:cNvPr id="19" name="Group 18">
+            <a:extLst>
+              <a:ext uri="{FF2B5EF4-FFF2-40B4-BE49-F238E27FC236}">
+                <a16:creationId xmlns:a16="http://schemas.microsoft.com/office/drawing/2014/main" id="{F912EC3C-D023-D143-24BD-B3629E2691DE}"/>
+              </a:ext>
+            </a:extLst>
+          </p:cNvPr>
+          <p:cNvGrpSpPr/>
+          <p:nvPr/>
+        </p:nvGrpSpPr>
+        <p:grpSpPr>
+          <a:xfrm>
+            <a:off x="858671" y="577493"/>
+            <a:ext cx="10474658" cy="9441376"/>
+            <a:chOff x="858671" y="577493"/>
+            <a:chExt cx="10474658" cy="9441376"/>
+          </a:xfrm>
+        </p:grpSpPr>
+        <p:cxnSp>
+          <p:nvCxnSpPr>
+            <p:cNvPr id="60" name="Straight Arrow Connector 59">
+              <a:extLst>
+                <a:ext uri="{FF2B5EF4-FFF2-40B4-BE49-F238E27FC236}">
+                  <a16:creationId xmlns:a16="http://schemas.microsoft.com/office/drawing/2014/main" id="{5FE6507C-2A94-DE57-2C51-897527EF36A1}"/>
+                </a:ext>
+              </a:extLst>
+            </p:cNvPr>
+            <p:cNvCxnSpPr>
+              <a:cxnSpLocks/>
+              <a:stCxn id="37" idx="2"/>
+              <a:endCxn id="34" idx="0"/>
+            </p:cNvCxnSpPr>
+            <p:nvPr/>
+          </p:nvCxnSpPr>
+          <p:spPr>
+            <a:xfrm>
+              <a:off x="3303600" y="5596129"/>
+              <a:ext cx="2792400" cy="2622740"/>
+            </a:xfrm>
+            <a:prstGeom prst="straightConnector1">
+              <a:avLst/>
+            </a:prstGeom>
+            <a:ln w="38100">
+              <a:solidFill>
+                <a:schemeClr val="tx1"/>
+              </a:solidFill>
+              <a:tailEnd type="triangle"/>
+            </a:ln>
+          </p:spPr>
+          <p:style>
+            <a:lnRef idx="1">
+              <a:schemeClr val="dk1"/>
+            </a:lnRef>
+            <a:fillRef idx="0">
+              <a:schemeClr val="dk1"/>
+            </a:fillRef>
+            <a:effectRef idx="0">
+              <a:schemeClr val="dk1"/>
+            </a:effectRef>
+            <a:fontRef idx="minor">
+              <a:schemeClr val="tx1"/>
+            </a:fontRef>
+          </p:style>
+        </p:cxnSp>
+        <p:sp>
+          <p:nvSpPr>
+            <p:cNvPr id="32" name="TextBox 31">
+              <a:extLst>
+                <a:ext uri="{FF2B5EF4-FFF2-40B4-BE49-F238E27FC236}">
+                  <a16:creationId xmlns:a16="http://schemas.microsoft.com/office/drawing/2014/main" id="{8A1903F9-FCBA-18F8-03B3-17199B1FDAC5}"/>
+                </a:ext>
+              </a:extLst>
+            </p:cNvPr>
+            <p:cNvSpPr txBox="1"/>
+            <p:nvPr/>
+          </p:nvSpPr>
+          <p:spPr>
+            <a:xfrm>
+              <a:off x="4267199" y="577493"/>
+              <a:ext cx="3657600" cy="461665"/>
+            </a:xfrm>
+            <a:prstGeom prst="rect">
+              <a:avLst/>
+            </a:prstGeom>
+            <a:noFill/>
+          </p:spPr>
+          <p:txBody>
+            <a:bodyPr wrap="square" rtlCol="0">
+              <a:spAutoFit/>
+            </a:bodyPr>
+            <a:lstStyle/>
+            <a:p>
+              <a:pPr algn="ctr"/>
+              <a:r>
+                <a:rPr lang="en-US" sz="2400" b="1" dirty="0"/>
+                <a:t>Immigration</a:t>
+              </a:r>
+            </a:p>
+          </p:txBody>
+        </p:sp>
+        <p:sp>
+          <p:nvSpPr>
+            <p:cNvPr id="34" name="Oval 33">
+              <a:extLst>
+                <a:ext uri="{FF2B5EF4-FFF2-40B4-BE49-F238E27FC236}">
+                  <a16:creationId xmlns:a16="http://schemas.microsoft.com/office/drawing/2014/main" id="{41D7BF1B-FF56-866E-5162-FB96BC162BD9}"/>
+                </a:ext>
+              </a:extLst>
+            </p:cNvPr>
+            <p:cNvSpPr/>
+            <p:nvPr/>
+          </p:nvSpPr>
+          <p:spPr>
+            <a:xfrm>
+              <a:off x="5196000" y="8218869"/>
+              <a:ext cx="1800000" cy="1800000"/>
+            </a:xfrm>
+            <a:prstGeom prst="ellipse">
+              <a:avLst/>
+            </a:prstGeom>
+            <a:ln w="38100">
+              <a:solidFill>
+                <a:schemeClr val="tx1"/>
+              </a:solidFill>
+            </a:ln>
+          </p:spPr>
+          <p:style>
+            <a:lnRef idx="2">
+              <a:schemeClr val="dk1"/>
+            </a:lnRef>
+            <a:fillRef idx="1">
+              <a:schemeClr val="lt1"/>
+            </a:fillRef>
+            <a:effectRef idx="0">
+              <a:schemeClr val="dk1"/>
+            </a:effectRef>
+            <a:fontRef idx="minor">
+              <a:schemeClr val="dk1"/>
+            </a:fontRef>
+          </p:style>
+          <p:txBody>
+            <a:bodyPr rtlCol="0" anchor="ctr"/>
+            <a:lstStyle/>
+            <a:p>
+              <a:pPr algn="ctr"/>
+              <a:r>
+                <a:rPr lang="en-US" sz="1550" dirty="0"/>
+                <a:t>Host community member’s wellbeing</a:t>
+              </a:r>
+            </a:p>
+          </p:txBody>
+        </p:sp>
+        <p:sp>
+          <p:nvSpPr>
+            <p:cNvPr id="35" name="Oval 34">
+              <a:extLst>
+                <a:ext uri="{FF2B5EF4-FFF2-40B4-BE49-F238E27FC236}">
+                  <a16:creationId xmlns:a16="http://schemas.microsoft.com/office/drawing/2014/main" id="{AC2BDD6A-7439-1BD4-1FD0-9F64CB309435}"/>
+                </a:ext>
+              </a:extLst>
+            </p:cNvPr>
+            <p:cNvSpPr/>
+            <p:nvPr/>
+          </p:nvSpPr>
+          <p:spPr>
+            <a:xfrm>
+              <a:off x="6923806" y="3427779"/>
+              <a:ext cx="1800000" cy="1800000"/>
+            </a:xfrm>
+            <a:prstGeom prst="ellipse">
+              <a:avLst/>
+            </a:prstGeom>
+            <a:ln w="38100">
+              <a:solidFill>
+                <a:schemeClr val="tx1"/>
+              </a:solidFill>
+            </a:ln>
+          </p:spPr>
+          <p:style>
+            <a:lnRef idx="2">
+              <a:schemeClr val="dk1"/>
+            </a:lnRef>
+            <a:fillRef idx="1">
+              <a:schemeClr val="lt1"/>
+            </a:fillRef>
+            <a:effectRef idx="0">
+              <a:schemeClr val="dk1"/>
+            </a:effectRef>
+            <a:fontRef idx="minor">
+              <a:schemeClr val="dk1"/>
+            </a:fontRef>
+          </p:style>
+          <p:txBody>
+            <a:bodyPr rtlCol="0" anchor="ctr"/>
+            <a:lstStyle/>
+            <a:p>
+              <a:pPr algn="ctr"/>
+              <a:r>
+                <a:rPr lang="en-US" sz="1550" dirty="0"/>
+                <a:t>Media narrative</a:t>
+              </a:r>
+            </a:p>
+          </p:txBody>
+        </p:sp>
+        <p:sp>
+          <p:nvSpPr>
+            <p:cNvPr id="37" name="Rectangle 36">
+              <a:extLst>
+                <a:ext uri="{FF2B5EF4-FFF2-40B4-BE49-F238E27FC236}">
+                  <a16:creationId xmlns:a16="http://schemas.microsoft.com/office/drawing/2014/main" id="{4CBF1E9E-C194-BBA3-BB49-6CFF7392D7D5}"/>
+                </a:ext>
+              </a:extLst>
+            </p:cNvPr>
+            <p:cNvSpPr/>
+            <p:nvPr/>
+          </p:nvSpPr>
+          <p:spPr>
+            <a:xfrm>
+              <a:off x="858671" y="2535959"/>
+              <a:ext cx="4889857" cy="3060170"/>
+            </a:xfrm>
+            <a:prstGeom prst="rect">
+              <a:avLst/>
+            </a:prstGeom>
+            <a:noFill/>
+            <a:ln w="38100">
+              <a:solidFill>
+                <a:schemeClr val="tx1"/>
+              </a:solidFill>
+            </a:ln>
+          </p:spPr>
+          <p:style>
+            <a:lnRef idx="2">
+              <a:schemeClr val="accent6"/>
+            </a:lnRef>
+            <a:fillRef idx="1">
+              <a:schemeClr val="lt1"/>
+            </a:fillRef>
+            <a:effectRef idx="0">
+              <a:schemeClr val="accent6"/>
+            </a:effectRef>
+            <a:fontRef idx="minor">
+              <a:schemeClr val="dk1"/>
+            </a:fontRef>
+          </p:style>
+          <p:txBody>
+            <a:bodyPr rtlCol="0" anchor="ctr"/>
+            <a:lstStyle/>
+            <a:p>
+              <a:pPr algn="ctr"/>
+              <a:endParaRPr lang="en-GB" sz="1550" dirty="0"/>
+            </a:p>
+          </p:txBody>
+        </p:sp>
+        <p:sp>
+          <p:nvSpPr>
+            <p:cNvPr id="2" name="TextBox 1">
+              <a:extLst>
+                <a:ext uri="{FF2B5EF4-FFF2-40B4-BE49-F238E27FC236}">
+                  <a16:creationId xmlns:a16="http://schemas.microsoft.com/office/drawing/2014/main" id="{03DF72A2-9F88-4125-0B10-C87E0115E059}"/>
+                </a:ext>
+              </a:extLst>
+            </p:cNvPr>
+            <p:cNvSpPr txBox="1"/>
+            <p:nvPr/>
+          </p:nvSpPr>
+          <p:spPr>
+            <a:xfrm>
+              <a:off x="2064220" y="2724912"/>
+              <a:ext cx="2478757" cy="369332"/>
+            </a:xfrm>
+            <a:prstGeom prst="rect">
+              <a:avLst/>
+            </a:prstGeom>
+            <a:noFill/>
+          </p:spPr>
+          <p:txBody>
+            <a:bodyPr wrap="none" rtlCol="0">
+              <a:spAutoFit/>
+            </a:bodyPr>
+            <a:lstStyle/>
+            <a:p>
+              <a:pPr algn="ctr"/>
+              <a:r>
+                <a:rPr lang="en-GB" b="1" dirty="0"/>
+                <a:t>Direct proximate effects</a:t>
+              </a:r>
+            </a:p>
+          </p:txBody>
+        </p:sp>
+        <p:sp>
+          <p:nvSpPr>
+            <p:cNvPr id="39" name="Rectangle 38">
+              <a:extLst>
+                <a:ext uri="{FF2B5EF4-FFF2-40B4-BE49-F238E27FC236}">
+                  <a16:creationId xmlns:a16="http://schemas.microsoft.com/office/drawing/2014/main" id="{64CBCB18-0871-DD14-8A64-812D7BC30D07}"/>
+                </a:ext>
+              </a:extLst>
+            </p:cNvPr>
+            <p:cNvSpPr/>
+            <p:nvPr/>
+          </p:nvSpPr>
+          <p:spPr>
+            <a:xfrm>
+              <a:off x="6443472" y="2535959"/>
+              <a:ext cx="4889857" cy="3060169"/>
+            </a:xfrm>
+            <a:prstGeom prst="rect">
+              <a:avLst/>
+            </a:prstGeom>
+            <a:noFill/>
+            <a:ln w="38100">
+              <a:solidFill>
+                <a:schemeClr val="tx1"/>
+              </a:solidFill>
+            </a:ln>
+          </p:spPr>
+          <p:style>
+            <a:lnRef idx="2">
+              <a:schemeClr val="accent6"/>
+            </a:lnRef>
+            <a:fillRef idx="1">
+              <a:schemeClr val="lt1"/>
+            </a:fillRef>
+            <a:effectRef idx="0">
+              <a:schemeClr val="accent6"/>
+            </a:effectRef>
+            <a:fontRef idx="minor">
+              <a:schemeClr val="dk1"/>
+            </a:fontRef>
+          </p:style>
+          <p:txBody>
+            <a:bodyPr rtlCol="0" anchor="ctr"/>
+            <a:lstStyle/>
+            <a:p>
+              <a:pPr algn="ctr"/>
+              <a:endParaRPr lang="en-GB" sz="1550" dirty="0"/>
+            </a:p>
+          </p:txBody>
+        </p:sp>
+        <p:sp>
+          <p:nvSpPr>
+            <p:cNvPr id="40" name="TextBox 39">
+              <a:extLst>
+                <a:ext uri="{FF2B5EF4-FFF2-40B4-BE49-F238E27FC236}">
+                  <a16:creationId xmlns:a16="http://schemas.microsoft.com/office/drawing/2014/main" id="{278F562F-9DD0-4A36-61F1-1A78A5BEFEA3}"/>
+                </a:ext>
+              </a:extLst>
+            </p:cNvPr>
+            <p:cNvSpPr txBox="1"/>
+            <p:nvPr/>
+          </p:nvSpPr>
+          <p:spPr>
+            <a:xfrm>
+              <a:off x="7622638" y="2724912"/>
+              <a:ext cx="2531527" cy="369332"/>
+            </a:xfrm>
+            <a:prstGeom prst="rect">
+              <a:avLst/>
+            </a:prstGeom>
+            <a:noFill/>
+          </p:spPr>
+          <p:txBody>
+            <a:bodyPr wrap="none" rtlCol="0">
+              <a:spAutoFit/>
+            </a:bodyPr>
+            <a:lstStyle/>
+            <a:p>
+              <a:pPr algn="ctr"/>
+              <a:r>
+                <a:rPr lang="en-GB" b="1" dirty="0"/>
+                <a:t>Indirect narrative effects</a:t>
+              </a:r>
+            </a:p>
+          </p:txBody>
+        </p:sp>
+        <p:sp>
+          <p:nvSpPr>
+            <p:cNvPr id="43" name="Oval 42">
+              <a:extLst>
+                <a:ext uri="{FF2B5EF4-FFF2-40B4-BE49-F238E27FC236}">
+                  <a16:creationId xmlns:a16="http://schemas.microsoft.com/office/drawing/2014/main" id="{5F8EE444-818D-00ED-A774-7D998FCFA3D5}"/>
+                </a:ext>
+              </a:extLst>
+            </p:cNvPr>
+            <p:cNvSpPr/>
+            <p:nvPr/>
+          </p:nvSpPr>
+          <p:spPr>
+            <a:xfrm>
+              <a:off x="9174717" y="3427779"/>
+              <a:ext cx="1800000" cy="1800000"/>
+            </a:xfrm>
+            <a:prstGeom prst="ellipse">
+              <a:avLst/>
+            </a:prstGeom>
+            <a:ln w="38100">
+              <a:solidFill>
+                <a:schemeClr val="tx1"/>
+              </a:solidFill>
+            </a:ln>
+          </p:spPr>
+          <p:style>
+            <a:lnRef idx="2">
+              <a:schemeClr val="dk1"/>
+            </a:lnRef>
+            <a:fillRef idx="1">
+              <a:schemeClr val="lt1"/>
+            </a:fillRef>
+            <a:effectRef idx="0">
+              <a:schemeClr val="dk1"/>
+            </a:effectRef>
+            <a:fontRef idx="minor">
+              <a:schemeClr val="dk1"/>
+            </a:fontRef>
+          </p:style>
+          <p:txBody>
+            <a:bodyPr rtlCol="0" anchor="ctr"/>
+            <a:lstStyle/>
+            <a:p>
+              <a:pPr algn="ctr"/>
+              <a:r>
+                <a:rPr lang="en-US" sz="1550" dirty="0"/>
+                <a:t>Political narrative</a:t>
+              </a:r>
+            </a:p>
+          </p:txBody>
+        </p:sp>
+        <p:sp>
+          <p:nvSpPr>
+            <p:cNvPr id="44" name="Oval 43">
+              <a:extLst>
+                <a:ext uri="{FF2B5EF4-FFF2-40B4-BE49-F238E27FC236}">
+                  <a16:creationId xmlns:a16="http://schemas.microsoft.com/office/drawing/2014/main" id="{444FCC29-8220-1445-0792-8A6CF401BAF9}"/>
+                </a:ext>
+              </a:extLst>
+            </p:cNvPr>
+            <p:cNvSpPr/>
+            <p:nvPr/>
+          </p:nvSpPr>
+          <p:spPr>
+            <a:xfrm>
+              <a:off x="1217283" y="3465111"/>
+              <a:ext cx="1800000" cy="1800000"/>
+            </a:xfrm>
+            <a:prstGeom prst="ellipse">
+              <a:avLst/>
+            </a:prstGeom>
+            <a:ln w="38100">
+              <a:solidFill>
+                <a:schemeClr val="tx1"/>
+              </a:solidFill>
+            </a:ln>
+          </p:spPr>
+          <p:style>
+            <a:lnRef idx="2">
+              <a:schemeClr val="dk1"/>
+            </a:lnRef>
+            <a:fillRef idx="1">
+              <a:schemeClr val="lt1"/>
+            </a:fillRef>
+            <a:effectRef idx="0">
+              <a:schemeClr val="dk1"/>
+            </a:effectRef>
+            <a:fontRef idx="minor">
+              <a:schemeClr val="dk1"/>
+            </a:fontRef>
+          </p:style>
+          <p:txBody>
+            <a:bodyPr rtlCol="0" anchor="ctr"/>
+            <a:lstStyle/>
+            <a:p>
+              <a:pPr algn="ctr"/>
+              <a:r>
+                <a:rPr lang="en-US" sz="1550" dirty="0"/>
+                <a:t>Immigrants in one’s local community</a:t>
+              </a:r>
+            </a:p>
+          </p:txBody>
+        </p:sp>
+        <p:sp>
+          <p:nvSpPr>
+            <p:cNvPr id="45" name="Oval 44">
+              <a:extLst>
+                <a:ext uri="{FF2B5EF4-FFF2-40B4-BE49-F238E27FC236}">
+                  <a16:creationId xmlns:a16="http://schemas.microsoft.com/office/drawing/2014/main" id="{35DE3741-C7B4-C64F-37CE-2B6D30C90CF0}"/>
+                </a:ext>
+              </a:extLst>
+            </p:cNvPr>
+            <p:cNvSpPr/>
+            <p:nvPr/>
+          </p:nvSpPr>
+          <p:spPr>
+            <a:xfrm>
+              <a:off x="3468194" y="3465111"/>
+              <a:ext cx="1800000" cy="1800000"/>
+            </a:xfrm>
+            <a:prstGeom prst="ellipse">
+              <a:avLst/>
+            </a:prstGeom>
+            <a:ln w="38100">
+              <a:solidFill>
+                <a:schemeClr val="tx1"/>
+              </a:solidFill>
+            </a:ln>
+          </p:spPr>
+          <p:style>
+            <a:lnRef idx="2">
+              <a:schemeClr val="dk1"/>
+            </a:lnRef>
+            <a:fillRef idx="1">
+              <a:schemeClr val="lt1"/>
+            </a:fillRef>
+            <a:effectRef idx="0">
+              <a:schemeClr val="dk1"/>
+            </a:effectRef>
+            <a:fontRef idx="minor">
+              <a:schemeClr val="dk1"/>
+            </a:fontRef>
+          </p:style>
+          <p:txBody>
+            <a:bodyPr rtlCol="0" anchor="ctr"/>
+            <a:lstStyle/>
+            <a:p>
+              <a:pPr algn="ctr"/>
+              <a:r>
+                <a:rPr lang="en-US" sz="1550" dirty="0"/>
+                <a:t>Socio-economic outcomes from immigration</a:t>
+              </a:r>
+            </a:p>
+          </p:txBody>
+        </p:sp>
+        <p:cxnSp>
+          <p:nvCxnSpPr>
+            <p:cNvPr id="50" name="Straight Arrow Connector 49">
+              <a:extLst>
+                <a:ext uri="{FF2B5EF4-FFF2-40B4-BE49-F238E27FC236}">
+                  <a16:creationId xmlns:a16="http://schemas.microsoft.com/office/drawing/2014/main" id="{60D27100-91DF-68C8-6149-E1B1DB6CFD12}"/>
+                </a:ext>
+              </a:extLst>
+            </p:cNvPr>
+            <p:cNvCxnSpPr>
+              <a:cxnSpLocks/>
+              <a:stCxn id="32" idx="2"/>
+            </p:cNvCxnSpPr>
+            <p:nvPr/>
+          </p:nvCxnSpPr>
+          <p:spPr>
+            <a:xfrm flipH="1">
+              <a:off x="3273552" y="1039158"/>
+              <a:ext cx="2822447" cy="1496801"/>
+            </a:xfrm>
+            <a:prstGeom prst="straightConnector1">
+              <a:avLst/>
+            </a:prstGeom>
+            <a:ln w="38100">
+              <a:solidFill>
+                <a:schemeClr val="tx1"/>
+              </a:solidFill>
+              <a:tailEnd type="triangle"/>
+            </a:ln>
+          </p:spPr>
+          <p:style>
+            <a:lnRef idx="1">
+              <a:schemeClr val="dk1"/>
+            </a:lnRef>
+            <a:fillRef idx="0">
+              <a:schemeClr val="dk1"/>
+            </a:fillRef>
+            <a:effectRef idx="0">
+              <a:schemeClr val="dk1"/>
+            </a:effectRef>
+            <a:fontRef idx="minor">
+              <a:schemeClr val="tx1"/>
+            </a:fontRef>
+          </p:style>
+        </p:cxnSp>
+        <p:cxnSp>
+          <p:nvCxnSpPr>
+            <p:cNvPr id="52" name="Straight Arrow Connector 51">
+              <a:extLst>
+                <a:ext uri="{FF2B5EF4-FFF2-40B4-BE49-F238E27FC236}">
+                  <a16:creationId xmlns:a16="http://schemas.microsoft.com/office/drawing/2014/main" id="{E5165CEE-EF31-46DA-7C57-4635F9564746}"/>
+                </a:ext>
+              </a:extLst>
+            </p:cNvPr>
+            <p:cNvCxnSpPr>
+              <a:cxnSpLocks/>
+              <a:stCxn id="32" idx="2"/>
+              <a:endCxn id="39" idx="0"/>
+            </p:cNvCxnSpPr>
+            <p:nvPr/>
+          </p:nvCxnSpPr>
+          <p:spPr>
+            <a:xfrm>
+              <a:off x="6095999" y="1039158"/>
+              <a:ext cx="2792402" cy="1496801"/>
+            </a:xfrm>
+            <a:prstGeom prst="straightConnector1">
+              <a:avLst/>
+            </a:prstGeom>
+            <a:ln w="38100">
+              <a:solidFill>
+                <a:schemeClr val="tx1"/>
+              </a:solidFill>
+              <a:tailEnd type="triangle"/>
+            </a:ln>
+          </p:spPr>
+          <p:style>
+            <a:lnRef idx="1">
+              <a:schemeClr val="dk1"/>
+            </a:lnRef>
+            <a:fillRef idx="0">
+              <a:schemeClr val="dk1"/>
+            </a:fillRef>
+            <a:effectRef idx="0">
+              <a:schemeClr val="dk1"/>
+            </a:effectRef>
+            <a:fontRef idx="minor">
+              <a:schemeClr val="tx1"/>
+            </a:fontRef>
+          </p:style>
+        </p:cxnSp>
+        <p:cxnSp>
+          <p:nvCxnSpPr>
+            <p:cNvPr id="55" name="Straight Arrow Connector 54">
+              <a:extLst>
+                <a:ext uri="{FF2B5EF4-FFF2-40B4-BE49-F238E27FC236}">
+                  <a16:creationId xmlns:a16="http://schemas.microsoft.com/office/drawing/2014/main" id="{1EE53EAB-CEB9-6BF7-BF68-9C6A1B2944CA}"/>
+                </a:ext>
+              </a:extLst>
+            </p:cNvPr>
+            <p:cNvCxnSpPr>
+              <a:cxnSpLocks/>
+              <a:endCxn id="34" idx="0"/>
+            </p:cNvCxnSpPr>
+            <p:nvPr/>
+          </p:nvCxnSpPr>
+          <p:spPr>
+            <a:xfrm flipH="1">
+              <a:off x="6096000" y="5596128"/>
+              <a:ext cx="2792401" cy="2622741"/>
+            </a:xfrm>
+            <a:prstGeom prst="straightConnector1">
+              <a:avLst/>
+            </a:prstGeom>
+            <a:ln w="38100">
+              <a:solidFill>
+                <a:schemeClr val="tx1"/>
+              </a:solidFill>
+              <a:tailEnd type="triangle"/>
+            </a:ln>
+          </p:spPr>
+          <p:style>
+            <a:lnRef idx="1">
+              <a:schemeClr val="dk1"/>
+            </a:lnRef>
+            <a:fillRef idx="0">
+              <a:schemeClr val="dk1"/>
+            </a:fillRef>
+            <a:effectRef idx="0">
+              <a:schemeClr val="dk1"/>
+            </a:effectRef>
+            <a:fontRef idx="minor">
+              <a:schemeClr val="tx1"/>
+            </a:fontRef>
+          </p:style>
+        </p:cxnSp>
+        <p:sp>
+          <p:nvSpPr>
+            <p:cNvPr id="47" name="Rectangle 46">
+              <a:extLst>
+                <a:ext uri="{FF2B5EF4-FFF2-40B4-BE49-F238E27FC236}">
+                  <a16:creationId xmlns:a16="http://schemas.microsoft.com/office/drawing/2014/main" id="{450B628E-A524-9A69-86E4-8C3378D15EF0}"/>
+                </a:ext>
+              </a:extLst>
+            </p:cNvPr>
+            <p:cNvSpPr/>
+            <p:nvPr/>
+          </p:nvSpPr>
+          <p:spPr>
+            <a:xfrm>
+              <a:off x="3651072" y="7105056"/>
+              <a:ext cx="4889857" cy="701884"/>
+            </a:xfrm>
+            <a:prstGeom prst="rect">
+              <a:avLst/>
+            </a:prstGeom>
+            <a:solidFill>
+              <a:schemeClr val="bg1"/>
+            </a:solidFill>
+            <a:ln w="38100">
+              <a:solidFill>
+                <a:schemeClr val="tx1"/>
+              </a:solidFill>
+            </a:ln>
+          </p:spPr>
+          <p:style>
+            <a:lnRef idx="2">
+              <a:schemeClr val="accent6"/>
+            </a:lnRef>
+            <a:fillRef idx="1">
+              <a:schemeClr val="lt1"/>
+            </a:fillRef>
+            <a:effectRef idx="0">
+              <a:schemeClr val="accent6"/>
+            </a:effectRef>
+            <a:fontRef idx="minor">
+              <a:schemeClr val="dk1"/>
+            </a:fontRef>
+          </p:style>
+          <p:txBody>
+            <a:bodyPr rtlCol="0" anchor="ctr"/>
+            <a:lstStyle/>
+            <a:p>
+              <a:pPr algn="ctr"/>
+              <a:endParaRPr lang="en-GB" sz="1550" dirty="0"/>
+            </a:p>
+          </p:txBody>
+        </p:sp>
+        <p:sp>
+          <p:nvSpPr>
+            <p:cNvPr id="6" name="TextBox 5">
+              <a:extLst>
+                <a:ext uri="{FF2B5EF4-FFF2-40B4-BE49-F238E27FC236}">
+                  <a16:creationId xmlns:a16="http://schemas.microsoft.com/office/drawing/2014/main" id="{BFAC6B3C-4D37-5259-CE3B-1BC98E01410E}"/>
+                </a:ext>
+              </a:extLst>
+            </p:cNvPr>
+            <p:cNvSpPr txBox="1"/>
+            <p:nvPr/>
+          </p:nvSpPr>
+          <p:spPr>
+            <a:xfrm>
+              <a:off x="3651072" y="7257521"/>
+              <a:ext cx="4889856" cy="369332"/>
+            </a:xfrm>
+            <a:prstGeom prst="rect">
+              <a:avLst/>
+            </a:prstGeom>
+            <a:noFill/>
+          </p:spPr>
+          <p:txBody>
+            <a:bodyPr wrap="square" rtlCol="0" anchor="ctr">
+              <a:spAutoFit/>
+            </a:bodyPr>
+            <a:lstStyle/>
+            <a:p>
+              <a:pPr algn="ctr"/>
+              <a:r>
+                <a:rPr lang="en-GB" b="1" dirty="0"/>
+                <a:t>Moderated by attitudes towards immigrants</a:t>
+              </a:r>
+            </a:p>
+          </p:txBody>
+        </p:sp>
+      </p:grpSp>
+    </p:spTree>
+    <p:extLst>
+      <p:ext uri="{BB962C8B-B14F-4D97-AF65-F5344CB8AC3E}">
+        <p14:creationId xmlns:p14="http://schemas.microsoft.com/office/powerpoint/2010/main" val="1497080368"/>
+      </p:ext>
+    </p:extLst>
+  </p:cSld>
+  <p:clrMapOvr>
+    <a:masterClrMapping/>
+  </p:clrMapOvr>
+</p:sld>
+</file>
+
+<file path=ppt/slides/slide3.xml><?xml version="1.0" encoding="utf-8"?>
+<p:sld xmlns:a="http://schemas.openxmlformats.org/drawingml/2006/main" xmlns:r="http://schemas.openxmlformats.org/officeDocument/2006/relationships" xmlns:p="http://schemas.openxmlformats.org/presentationml/2006/main">
+  <p:cSld>
+    <p:spTree>
+      <p:nvGrpSpPr>
+        <p:cNvPr id="1" name=""/>
+        <p:cNvGrpSpPr/>
+        <p:nvPr/>
+      </p:nvGrpSpPr>
+      <p:grpSpPr>
+        <a:xfrm>
+          <a:off x="0" y="0"/>
+          <a:ext cx="0" cy="0"/>
+          <a:chOff x="0" y="0"/>
+          <a:chExt cx="0" cy="0"/>
+        </a:xfrm>
+      </p:grpSpPr>
+      <p:grpSp>
+        <p:nvGrpSpPr>
           <p:cNvPr id="2" name="Group 1">
             <a:extLst>
               <a:ext uri="{FF2B5EF4-FFF2-40B4-BE49-F238E27FC236}">
@@ -4963,7 +5753,7 @@
 </p:sld>
 </file>
 
-<file path=ppt/slides/slide3.xml><?xml version="1.0" encoding="utf-8"?>
+<file path=ppt/slides/slide4.xml><?xml version="1.0" encoding="utf-8"?>
 <p:sld xmlns:a="http://schemas.openxmlformats.org/drawingml/2006/main" xmlns:r="http://schemas.openxmlformats.org/officeDocument/2006/relationships" xmlns:p="http://schemas.openxmlformats.org/presentationml/2006/main">
   <p:cSld>
     <p:spTree>

</xml_diff>

<commit_message>
new version of host spillover graph
</commit_message>
<xml_diff>
--- a/causalgraphs.pptx
+++ b/causalgraphs.pptx
@@ -4391,10 +4391,10 @@
       </p:grpSpPr>
       <p:grpSp>
         <p:nvGrpSpPr>
-          <p:cNvPr id="19" name="Group 18">
+          <p:cNvPr id="146" name="Group 145">
             <a:extLst>
               <a:ext uri="{FF2B5EF4-FFF2-40B4-BE49-F238E27FC236}">
-                <a16:creationId xmlns:a16="http://schemas.microsoft.com/office/drawing/2014/main" id="{F912EC3C-D023-D143-24BD-B3629E2691DE}"/>
+                <a16:creationId xmlns:a16="http://schemas.microsoft.com/office/drawing/2014/main" id="{3246CEAB-689F-1275-4012-BC2AEEFD39B1}"/>
               </a:ext>
             </a:extLst>
           </p:cNvPr>
@@ -4403,10 +4403,10 @@
         </p:nvGrpSpPr>
         <p:grpSpPr>
           <a:xfrm>
-            <a:off x="858671" y="577493"/>
-            <a:ext cx="10474658" cy="9441376"/>
-            <a:chOff x="858671" y="577493"/>
-            <a:chExt cx="10474658" cy="9441376"/>
+            <a:off x="1035887" y="577493"/>
+            <a:ext cx="10567824" cy="9801376"/>
+            <a:chOff x="1035887" y="577493"/>
+            <a:chExt cx="10567824" cy="9801376"/>
           </a:xfrm>
         </p:grpSpPr>
         <p:cxnSp>
@@ -4420,15 +4420,15 @@
             </p:cNvPr>
             <p:cNvCxnSpPr>
               <a:cxnSpLocks/>
-              <a:stCxn id="37" idx="2"/>
+              <a:stCxn id="44" idx="4"/>
               <a:endCxn id="34" idx="0"/>
             </p:cNvCxnSpPr>
             <p:nvPr/>
           </p:nvCxnSpPr>
           <p:spPr>
             <a:xfrm>
-              <a:off x="3303600" y="5596129"/>
-              <a:ext cx="2792400" cy="2622740"/>
+              <a:off x="2856000" y="4396094"/>
+              <a:ext cx="3303071" cy="3822775"/>
             </a:xfrm>
             <a:prstGeom prst="straightConnector1">
               <a:avLst/>
@@ -4505,8 +4505,8 @@
           </p:nvSpPr>
           <p:spPr>
             <a:xfrm>
-              <a:off x="5196000" y="8218869"/>
-              <a:ext cx="1800000" cy="1800000"/>
+              <a:off x="5079071" y="8218869"/>
+              <a:ext cx="2160000" cy="2160000"/>
             </a:xfrm>
             <a:prstGeom prst="ellipse">
               <a:avLst/>
@@ -4537,7 +4537,7 @@
             <a:p>
               <a:pPr algn="ctr"/>
               <a:r>
-                <a:rPr lang="en-US" sz="1550" dirty="0"/>
+                <a:rPr lang="en-US" dirty="0"/>
                 <a:t>Host community member’s wellbeing</a:t>
               </a:r>
             </a:p>
@@ -4557,8 +4557,8 @@
           </p:nvSpPr>
           <p:spPr>
             <a:xfrm>
-              <a:off x="6923806" y="3427779"/>
-              <a:ext cx="1800000" cy="1800000"/>
+              <a:off x="8255999" y="2236094"/>
+              <a:ext cx="2160000" cy="2160000"/>
             </a:xfrm>
             <a:prstGeom prst="ellipse">
               <a:avLst/>
@@ -4589,232 +4589,8 @@
             <a:p>
               <a:pPr algn="ctr"/>
               <a:r>
-                <a:rPr lang="en-US" sz="1550" dirty="0"/>
-                <a:t>Media narrative</a:t>
-              </a:r>
-            </a:p>
-          </p:txBody>
-        </p:sp>
-        <p:sp>
-          <p:nvSpPr>
-            <p:cNvPr id="37" name="Rectangle 36">
-              <a:extLst>
-                <a:ext uri="{FF2B5EF4-FFF2-40B4-BE49-F238E27FC236}">
-                  <a16:creationId xmlns:a16="http://schemas.microsoft.com/office/drawing/2014/main" id="{4CBF1E9E-C194-BBA3-BB49-6CFF7392D7D5}"/>
-                </a:ext>
-              </a:extLst>
-            </p:cNvPr>
-            <p:cNvSpPr/>
-            <p:nvPr/>
-          </p:nvSpPr>
-          <p:spPr>
-            <a:xfrm>
-              <a:off x="858671" y="2535959"/>
-              <a:ext cx="4889857" cy="3060170"/>
-            </a:xfrm>
-            <a:prstGeom prst="rect">
-              <a:avLst/>
-            </a:prstGeom>
-            <a:noFill/>
-            <a:ln w="38100">
-              <a:solidFill>
-                <a:schemeClr val="tx1"/>
-              </a:solidFill>
-            </a:ln>
-          </p:spPr>
-          <p:style>
-            <a:lnRef idx="2">
-              <a:schemeClr val="accent6"/>
-            </a:lnRef>
-            <a:fillRef idx="1">
-              <a:schemeClr val="lt1"/>
-            </a:fillRef>
-            <a:effectRef idx="0">
-              <a:schemeClr val="accent6"/>
-            </a:effectRef>
-            <a:fontRef idx="minor">
-              <a:schemeClr val="dk1"/>
-            </a:fontRef>
-          </p:style>
-          <p:txBody>
-            <a:bodyPr rtlCol="0" anchor="ctr"/>
-            <a:lstStyle/>
-            <a:p>
-              <a:pPr algn="ctr"/>
-              <a:endParaRPr lang="en-GB" sz="1550" dirty="0"/>
-            </a:p>
-          </p:txBody>
-        </p:sp>
-        <p:sp>
-          <p:nvSpPr>
-            <p:cNvPr id="2" name="TextBox 1">
-              <a:extLst>
-                <a:ext uri="{FF2B5EF4-FFF2-40B4-BE49-F238E27FC236}">
-                  <a16:creationId xmlns:a16="http://schemas.microsoft.com/office/drawing/2014/main" id="{03DF72A2-9F88-4125-0B10-C87E0115E059}"/>
-                </a:ext>
-              </a:extLst>
-            </p:cNvPr>
-            <p:cNvSpPr txBox="1"/>
-            <p:nvPr/>
-          </p:nvSpPr>
-          <p:spPr>
-            <a:xfrm>
-              <a:off x="2064220" y="2724912"/>
-              <a:ext cx="2478757" cy="369332"/>
-            </a:xfrm>
-            <a:prstGeom prst="rect">
-              <a:avLst/>
-            </a:prstGeom>
-            <a:noFill/>
-          </p:spPr>
-          <p:txBody>
-            <a:bodyPr wrap="none" rtlCol="0">
-              <a:spAutoFit/>
-            </a:bodyPr>
-            <a:lstStyle/>
-            <a:p>
-              <a:pPr algn="ctr"/>
-              <a:r>
-                <a:rPr lang="en-GB" b="1" dirty="0"/>
-                <a:t>Direct proximate effects</a:t>
-              </a:r>
-            </a:p>
-          </p:txBody>
-        </p:sp>
-        <p:sp>
-          <p:nvSpPr>
-            <p:cNvPr id="39" name="Rectangle 38">
-              <a:extLst>
-                <a:ext uri="{FF2B5EF4-FFF2-40B4-BE49-F238E27FC236}">
-                  <a16:creationId xmlns:a16="http://schemas.microsoft.com/office/drawing/2014/main" id="{64CBCB18-0871-DD14-8A64-812D7BC30D07}"/>
-                </a:ext>
-              </a:extLst>
-            </p:cNvPr>
-            <p:cNvSpPr/>
-            <p:nvPr/>
-          </p:nvSpPr>
-          <p:spPr>
-            <a:xfrm>
-              <a:off x="6443472" y="2535959"/>
-              <a:ext cx="4889857" cy="3060169"/>
-            </a:xfrm>
-            <a:prstGeom prst="rect">
-              <a:avLst/>
-            </a:prstGeom>
-            <a:noFill/>
-            <a:ln w="38100">
-              <a:solidFill>
-                <a:schemeClr val="tx1"/>
-              </a:solidFill>
-            </a:ln>
-          </p:spPr>
-          <p:style>
-            <a:lnRef idx="2">
-              <a:schemeClr val="accent6"/>
-            </a:lnRef>
-            <a:fillRef idx="1">
-              <a:schemeClr val="lt1"/>
-            </a:fillRef>
-            <a:effectRef idx="0">
-              <a:schemeClr val="accent6"/>
-            </a:effectRef>
-            <a:fontRef idx="minor">
-              <a:schemeClr val="dk1"/>
-            </a:fontRef>
-          </p:style>
-          <p:txBody>
-            <a:bodyPr rtlCol="0" anchor="ctr"/>
-            <a:lstStyle/>
-            <a:p>
-              <a:pPr algn="ctr"/>
-              <a:endParaRPr lang="en-GB" sz="1550" dirty="0"/>
-            </a:p>
-          </p:txBody>
-        </p:sp>
-        <p:sp>
-          <p:nvSpPr>
-            <p:cNvPr id="40" name="TextBox 39">
-              <a:extLst>
-                <a:ext uri="{FF2B5EF4-FFF2-40B4-BE49-F238E27FC236}">
-                  <a16:creationId xmlns:a16="http://schemas.microsoft.com/office/drawing/2014/main" id="{278F562F-9DD0-4A36-61F1-1A78A5BEFEA3}"/>
-                </a:ext>
-              </a:extLst>
-            </p:cNvPr>
-            <p:cNvSpPr txBox="1"/>
-            <p:nvPr/>
-          </p:nvSpPr>
-          <p:spPr>
-            <a:xfrm>
-              <a:off x="7622638" y="2724912"/>
-              <a:ext cx="2531527" cy="369332"/>
-            </a:xfrm>
-            <a:prstGeom prst="rect">
-              <a:avLst/>
-            </a:prstGeom>
-            <a:noFill/>
-          </p:spPr>
-          <p:txBody>
-            <a:bodyPr wrap="none" rtlCol="0">
-              <a:spAutoFit/>
-            </a:bodyPr>
-            <a:lstStyle/>
-            <a:p>
-              <a:pPr algn="ctr"/>
-              <a:r>
-                <a:rPr lang="en-GB" b="1" dirty="0"/>
-                <a:t>Indirect narrative effects</a:t>
-              </a:r>
-            </a:p>
-          </p:txBody>
-        </p:sp>
-        <p:sp>
-          <p:nvSpPr>
-            <p:cNvPr id="43" name="Oval 42">
-              <a:extLst>
-                <a:ext uri="{FF2B5EF4-FFF2-40B4-BE49-F238E27FC236}">
-                  <a16:creationId xmlns:a16="http://schemas.microsoft.com/office/drawing/2014/main" id="{5F8EE444-818D-00ED-A774-7D998FCFA3D5}"/>
-                </a:ext>
-              </a:extLst>
-            </p:cNvPr>
-            <p:cNvSpPr/>
-            <p:nvPr/>
-          </p:nvSpPr>
-          <p:spPr>
-            <a:xfrm>
-              <a:off x="9174717" y="3427779"/>
-              <a:ext cx="1800000" cy="1800000"/>
-            </a:xfrm>
-            <a:prstGeom prst="ellipse">
-              <a:avLst/>
-            </a:prstGeom>
-            <a:ln w="38100">
-              <a:solidFill>
-                <a:schemeClr val="tx1"/>
-              </a:solidFill>
-            </a:ln>
-          </p:spPr>
-          <p:style>
-            <a:lnRef idx="2">
-              <a:schemeClr val="dk1"/>
-            </a:lnRef>
-            <a:fillRef idx="1">
-              <a:schemeClr val="lt1"/>
-            </a:fillRef>
-            <a:effectRef idx="0">
-              <a:schemeClr val="dk1"/>
-            </a:effectRef>
-            <a:fontRef idx="minor">
-              <a:schemeClr val="dk1"/>
-            </a:fontRef>
-          </p:style>
-          <p:txBody>
-            <a:bodyPr rtlCol="0" anchor="ctr"/>
-            <a:lstStyle/>
-            <a:p>
-              <a:pPr algn="ctr"/>
-              <a:r>
-                <a:rPr lang="en-US" sz="1550" dirty="0"/>
-                <a:t>Political narrative</a:t>
+                <a:rPr lang="en-US" dirty="0"/>
+                <a:t>Media and Political  narrative</a:t>
               </a:r>
             </a:p>
           </p:txBody>
@@ -4833,8 +4609,8 @@
           </p:nvSpPr>
           <p:spPr>
             <a:xfrm>
-              <a:off x="1217283" y="3465111"/>
-              <a:ext cx="1800000" cy="1800000"/>
+              <a:off x="1776000" y="2236094"/>
+              <a:ext cx="2160000" cy="2160000"/>
             </a:xfrm>
             <a:prstGeom prst="ellipse">
               <a:avLst/>
@@ -4865,8 +4641,8 @@
             <a:p>
               <a:pPr algn="ctr"/>
               <a:r>
-                <a:rPr lang="en-US" sz="1550" dirty="0"/>
-                <a:t>Immigrants in one’s local community</a:t>
+                <a:rPr lang="en-US" dirty="0"/>
+                <a:t>Contact with immigrants in one’s local community</a:t>
               </a:r>
             </a:p>
           </p:txBody>
@@ -4885,8 +4661,8 @@
           </p:nvSpPr>
           <p:spPr>
             <a:xfrm>
-              <a:off x="3468194" y="3465111"/>
-              <a:ext cx="1800000" cy="1800000"/>
+              <a:off x="5015999" y="2236094"/>
+              <a:ext cx="2160000" cy="2160000"/>
             </a:xfrm>
             <a:prstGeom prst="ellipse">
               <a:avLst/>
@@ -4917,7 +4693,7 @@
             <a:p>
               <a:pPr algn="ctr"/>
               <a:r>
-                <a:rPr lang="en-US" sz="1550" dirty="0"/>
+                <a:rPr lang="en-US" dirty="0"/>
                 <a:t>Socio-economic outcomes from immigration</a:t>
               </a:r>
             </a:p>
@@ -4935,13 +4711,14 @@
             <p:cNvCxnSpPr>
               <a:cxnSpLocks/>
               <a:stCxn id="32" idx="2"/>
+              <a:endCxn id="44" idx="0"/>
             </p:cNvCxnSpPr>
             <p:nvPr/>
           </p:nvCxnSpPr>
           <p:spPr>
             <a:xfrm flipH="1">
-              <a:off x="3273552" y="1039158"/>
-              <a:ext cx="2822447" cy="1496801"/>
+              <a:off x="2856000" y="1039158"/>
+              <a:ext cx="3239999" cy="1196936"/>
             </a:xfrm>
             <a:prstGeom prst="straightConnector1">
               <a:avLst/>
@@ -4980,14 +4757,14 @@
             <p:cNvCxnSpPr>
               <a:cxnSpLocks/>
               <a:stCxn id="32" idx="2"/>
-              <a:endCxn id="39" idx="0"/>
+              <a:endCxn id="35" idx="0"/>
             </p:cNvCxnSpPr>
             <p:nvPr/>
           </p:nvCxnSpPr>
           <p:spPr>
             <a:xfrm>
               <a:off x="6095999" y="1039158"/>
-              <a:ext cx="2792402" cy="1496801"/>
+              <a:ext cx="3240000" cy="1196936"/>
             </a:xfrm>
             <a:prstGeom prst="straightConnector1">
               <a:avLst/>
@@ -5025,14 +4802,15 @@
             </p:cNvPr>
             <p:cNvCxnSpPr>
               <a:cxnSpLocks/>
+              <a:stCxn id="35" idx="4"/>
               <a:endCxn id="34" idx="0"/>
             </p:cNvCxnSpPr>
             <p:nvPr/>
           </p:nvCxnSpPr>
           <p:spPr>
             <a:xfrm flipH="1">
-              <a:off x="6096000" y="5596128"/>
-              <a:ext cx="2792401" cy="2622741"/>
+              <a:off x="6159071" y="4396094"/>
+              <a:ext cx="3176928" cy="3822775"/>
             </a:xfrm>
             <a:prstGeom prst="straightConnector1">
               <a:avLst/>
@@ -5061,10 +4839,10 @@
         </p:cxnSp>
         <p:sp>
           <p:nvSpPr>
-            <p:cNvPr id="47" name="Rectangle 46">
+            <p:cNvPr id="20" name="Rounded Rectangle 19">
               <a:extLst>
                 <a:ext uri="{FF2B5EF4-FFF2-40B4-BE49-F238E27FC236}">
-                  <a16:creationId xmlns:a16="http://schemas.microsoft.com/office/drawing/2014/main" id="{450B628E-A524-9A69-86E4-8C3378D15EF0}"/>
+                  <a16:creationId xmlns:a16="http://schemas.microsoft.com/office/drawing/2014/main" id="{4EE6C4F0-E7DA-7DDD-0239-422C797E4471}"/>
                 </a:ext>
               </a:extLst>
             </p:cNvPr>
@@ -5073,15 +4851,12 @@
           </p:nvSpPr>
           <p:spPr>
             <a:xfrm>
-              <a:off x="3651072" y="7105056"/>
-              <a:ext cx="4889857" cy="701884"/>
+              <a:off x="9335999" y="4757071"/>
+              <a:ext cx="2267712" cy="2443035"/>
             </a:xfrm>
-            <a:prstGeom prst="rect">
+            <a:prstGeom prst="roundRect">
               <a:avLst/>
             </a:prstGeom>
-            <a:solidFill>
-              <a:schemeClr val="bg1"/>
-            </a:solidFill>
             <a:ln w="38100">
               <a:solidFill>
                 <a:schemeClr val="tx1"/>
@@ -5107,46 +4882,1020 @@
             <a:lstStyle/>
             <a:p>
               <a:pPr algn="ctr"/>
-              <a:endParaRPr lang="en-GB" sz="1550" dirty="0"/>
+              <a:r>
+                <a:rPr lang="en-GB" dirty="0"/>
+                <a:t>Moderated by other </a:t>
+              </a:r>
+              <a:r>
+                <a:rPr lang="en-GB" b="1" dirty="0"/>
+                <a:t>individual characteristics</a:t>
+              </a:r>
+              <a:br>
+                <a:rPr lang="en-GB" dirty="0"/>
+              </a:br>
+              <a:r>
+                <a:rPr lang="en-GB" dirty="0"/>
+                <a:t>-</a:t>
+              </a:r>
+              <a:br>
+                <a:rPr lang="en-GB" dirty="0"/>
+              </a:br>
+              <a:r>
+                <a:rPr lang="en-GB" dirty="0"/>
+                <a:t>age, gender, income, education, employment </a:t>
+              </a:r>
             </a:p>
           </p:txBody>
         </p:sp>
         <p:sp>
           <p:nvSpPr>
-            <p:cNvPr id="6" name="TextBox 5">
+            <p:cNvPr id="63" name="Rounded Rectangle 62">
               <a:extLst>
                 <a:ext uri="{FF2B5EF4-FFF2-40B4-BE49-F238E27FC236}">
-                  <a16:creationId xmlns:a16="http://schemas.microsoft.com/office/drawing/2014/main" id="{BFAC6B3C-4D37-5259-CE3B-1BC98E01410E}"/>
+                  <a16:creationId xmlns:a16="http://schemas.microsoft.com/office/drawing/2014/main" id="{9AD68CC9-6A6D-9C41-C1AF-811FEF4930B5}"/>
                 </a:ext>
               </a:extLst>
             </p:cNvPr>
-            <p:cNvSpPr txBox="1"/>
+            <p:cNvSpPr/>
             <p:nvPr/>
           </p:nvSpPr>
           <p:spPr>
             <a:xfrm>
-              <a:off x="3651072" y="7257521"/>
-              <a:ext cx="4889856" cy="369332"/>
+              <a:off x="1035887" y="4821455"/>
+              <a:ext cx="1800000" cy="1800001"/>
             </a:xfrm>
-            <a:prstGeom prst="rect">
+            <a:prstGeom prst="roundRect">
               <a:avLst/>
             </a:prstGeom>
-            <a:noFill/>
+            <a:ln w="38100">
+              <a:solidFill>
+                <a:schemeClr val="tx1"/>
+              </a:solidFill>
+            </a:ln>
           </p:spPr>
+          <p:style>
+            <a:lnRef idx="2">
+              <a:schemeClr val="accent6"/>
+            </a:lnRef>
+            <a:fillRef idx="1">
+              <a:schemeClr val="lt1"/>
+            </a:fillRef>
+            <a:effectRef idx="0">
+              <a:schemeClr val="accent6"/>
+            </a:effectRef>
+            <a:fontRef idx="minor">
+              <a:schemeClr val="dk1"/>
+            </a:fontRef>
+          </p:style>
           <p:txBody>
-            <a:bodyPr wrap="square" rtlCol="0" anchor="ctr">
-              <a:spAutoFit/>
-            </a:bodyPr>
+            <a:bodyPr rtlCol="0" anchor="ctr"/>
             <a:lstStyle/>
             <a:p>
               <a:pPr algn="ctr"/>
               <a:r>
+                <a:rPr lang="en-GB" dirty="0"/>
+                <a:t>Moderated by </a:t>
+              </a:r>
+              <a:r>
                 <a:rPr lang="en-GB" b="1" dirty="0"/>
-                <a:t>Moderated by attitudes towards immigrants</a:t>
+                <a:t>dose-response relationship</a:t>
               </a:r>
+              <a:endParaRPr lang="en-GB" dirty="0"/>
             </a:p>
           </p:txBody>
         </p:sp>
+        <p:sp>
+          <p:nvSpPr>
+            <p:cNvPr id="66" name="Rounded Rectangle 65">
+              <a:extLst>
+                <a:ext uri="{FF2B5EF4-FFF2-40B4-BE49-F238E27FC236}">
+                  <a16:creationId xmlns:a16="http://schemas.microsoft.com/office/drawing/2014/main" id="{6AE15229-AF46-B23C-71AC-59640C5BB8E5}"/>
+                </a:ext>
+              </a:extLst>
+            </p:cNvPr>
+            <p:cNvSpPr/>
+            <p:nvPr/>
+          </p:nvSpPr>
+          <p:spPr>
+            <a:xfrm>
+              <a:off x="1035887" y="6949816"/>
+              <a:ext cx="1800000" cy="1800001"/>
+            </a:xfrm>
+            <a:prstGeom prst="roundRect">
+              <a:avLst/>
+            </a:prstGeom>
+            <a:ln w="38100">
+              <a:solidFill>
+                <a:schemeClr val="tx1"/>
+              </a:solidFill>
+            </a:ln>
+          </p:spPr>
+          <p:style>
+            <a:lnRef idx="2">
+              <a:schemeClr val="accent6"/>
+            </a:lnRef>
+            <a:fillRef idx="1">
+              <a:schemeClr val="lt1"/>
+            </a:fillRef>
+            <a:effectRef idx="0">
+              <a:schemeClr val="accent6"/>
+            </a:effectRef>
+            <a:fontRef idx="minor">
+              <a:schemeClr val="dk1"/>
+            </a:fontRef>
+          </p:style>
+          <p:txBody>
+            <a:bodyPr rtlCol="0" anchor="ctr"/>
+            <a:lstStyle/>
+            <a:p>
+              <a:pPr algn="ctr"/>
+              <a:r>
+                <a:rPr lang="en-GB" dirty="0"/>
+                <a:t>Moderated by </a:t>
+              </a:r>
+              <a:r>
+                <a:rPr lang="en-GB" b="1" dirty="0"/>
+                <a:t>proximity</a:t>
+              </a:r>
+              <a:endParaRPr lang="en-GB" dirty="0"/>
+            </a:p>
+          </p:txBody>
+        </p:sp>
+        <p:sp>
+          <p:nvSpPr>
+            <p:cNvPr id="67" name="Rounded Rectangle 66">
+              <a:extLst>
+                <a:ext uri="{FF2B5EF4-FFF2-40B4-BE49-F238E27FC236}">
+                  <a16:creationId xmlns:a16="http://schemas.microsoft.com/office/drawing/2014/main" id="{4D9EEA77-19F3-95F8-9041-B23BCB043ED6}"/>
+                </a:ext>
+              </a:extLst>
+            </p:cNvPr>
+            <p:cNvSpPr/>
+            <p:nvPr/>
+          </p:nvSpPr>
+          <p:spPr>
+            <a:xfrm>
+              <a:off x="8216613" y="7444015"/>
+              <a:ext cx="1905014" cy="1800001"/>
+            </a:xfrm>
+            <a:prstGeom prst="roundRect">
+              <a:avLst/>
+            </a:prstGeom>
+            <a:ln w="38100">
+              <a:solidFill>
+                <a:schemeClr val="tx1"/>
+              </a:solidFill>
+            </a:ln>
+          </p:spPr>
+          <p:style>
+            <a:lnRef idx="2">
+              <a:schemeClr val="accent6"/>
+            </a:lnRef>
+            <a:fillRef idx="1">
+              <a:schemeClr val="lt1"/>
+            </a:fillRef>
+            <a:effectRef idx="0">
+              <a:schemeClr val="accent6"/>
+            </a:effectRef>
+            <a:fontRef idx="minor">
+              <a:schemeClr val="dk1"/>
+            </a:fontRef>
+          </p:style>
+          <p:txBody>
+            <a:bodyPr rtlCol="0" anchor="ctr"/>
+            <a:lstStyle/>
+            <a:p>
+              <a:pPr algn="ctr"/>
+              <a:r>
+                <a:rPr lang="en-GB" dirty="0"/>
+                <a:t>Moderated by </a:t>
+              </a:r>
+              <a:r>
+                <a:rPr lang="en-GB" b="1" dirty="0"/>
+                <a:t>attitudes towards immigration</a:t>
+              </a:r>
+              <a:endParaRPr lang="en-GB" dirty="0"/>
+            </a:p>
+          </p:txBody>
+        </p:sp>
+        <p:cxnSp>
+          <p:nvCxnSpPr>
+            <p:cNvPr id="71" name="Straight Arrow Connector 70">
+              <a:extLst>
+                <a:ext uri="{FF2B5EF4-FFF2-40B4-BE49-F238E27FC236}">
+                  <a16:creationId xmlns:a16="http://schemas.microsoft.com/office/drawing/2014/main" id="{2169DBA6-0358-A013-35CD-C355D3BA79AD}"/>
+                </a:ext>
+              </a:extLst>
+            </p:cNvPr>
+            <p:cNvCxnSpPr>
+              <a:cxnSpLocks/>
+              <a:stCxn id="32" idx="2"/>
+              <a:endCxn id="45" idx="0"/>
+            </p:cNvCxnSpPr>
+            <p:nvPr/>
+          </p:nvCxnSpPr>
+          <p:spPr>
+            <a:xfrm>
+              <a:off x="6095999" y="1039158"/>
+              <a:ext cx="0" cy="1196936"/>
+            </a:xfrm>
+            <a:prstGeom prst="straightConnector1">
+              <a:avLst/>
+            </a:prstGeom>
+            <a:ln w="38100">
+              <a:solidFill>
+                <a:schemeClr val="tx1"/>
+              </a:solidFill>
+              <a:tailEnd type="triangle"/>
+            </a:ln>
+          </p:spPr>
+          <p:style>
+            <a:lnRef idx="1">
+              <a:schemeClr val="dk1"/>
+            </a:lnRef>
+            <a:fillRef idx="0">
+              <a:schemeClr val="dk1"/>
+            </a:fillRef>
+            <a:effectRef idx="0">
+              <a:schemeClr val="dk1"/>
+            </a:effectRef>
+            <a:fontRef idx="minor">
+              <a:schemeClr val="tx1"/>
+            </a:fontRef>
+          </p:style>
+        </p:cxnSp>
+        <p:cxnSp>
+          <p:nvCxnSpPr>
+            <p:cNvPr id="78" name="Straight Arrow Connector 77">
+              <a:extLst>
+                <a:ext uri="{FF2B5EF4-FFF2-40B4-BE49-F238E27FC236}">
+                  <a16:creationId xmlns:a16="http://schemas.microsoft.com/office/drawing/2014/main" id="{403A27B8-F90D-E325-33CC-44F35478D09A}"/>
+                </a:ext>
+              </a:extLst>
+            </p:cNvPr>
+            <p:cNvCxnSpPr>
+              <a:cxnSpLocks/>
+              <a:stCxn id="45" idx="4"/>
+              <a:endCxn id="34" idx="0"/>
+            </p:cNvCxnSpPr>
+            <p:nvPr/>
+          </p:nvCxnSpPr>
+          <p:spPr>
+            <a:xfrm>
+              <a:off x="6095999" y="4396094"/>
+              <a:ext cx="63072" cy="3822775"/>
+            </a:xfrm>
+            <a:prstGeom prst="straightConnector1">
+              <a:avLst/>
+            </a:prstGeom>
+            <a:ln w="38100">
+              <a:solidFill>
+                <a:schemeClr val="tx1"/>
+              </a:solidFill>
+              <a:tailEnd type="triangle"/>
+            </a:ln>
+          </p:spPr>
+          <p:style>
+            <a:lnRef idx="1">
+              <a:schemeClr val="dk1"/>
+            </a:lnRef>
+            <a:fillRef idx="0">
+              <a:schemeClr val="dk1"/>
+            </a:fillRef>
+            <a:effectRef idx="0">
+              <a:schemeClr val="dk1"/>
+            </a:effectRef>
+            <a:fontRef idx="minor">
+              <a:schemeClr val="tx1"/>
+            </a:fontRef>
+          </p:style>
+        </p:cxnSp>
+        <p:cxnSp>
+          <p:nvCxnSpPr>
+            <p:cNvPr id="84" name="Straight Arrow Connector 83">
+              <a:extLst>
+                <a:ext uri="{FF2B5EF4-FFF2-40B4-BE49-F238E27FC236}">
+                  <a16:creationId xmlns:a16="http://schemas.microsoft.com/office/drawing/2014/main" id="{6F02A25F-3A52-4C74-77B7-00574B0EBFDB}"/>
+                </a:ext>
+              </a:extLst>
+            </p:cNvPr>
+            <p:cNvCxnSpPr>
+              <a:cxnSpLocks/>
+              <a:stCxn id="63" idx="3"/>
+            </p:cNvCxnSpPr>
+            <p:nvPr/>
+          </p:nvCxnSpPr>
+          <p:spPr>
+            <a:xfrm flipV="1">
+              <a:off x="2835887" y="5167059"/>
+              <a:ext cx="583799" cy="554397"/>
+            </a:xfrm>
+            <a:prstGeom prst="straightConnector1">
+              <a:avLst/>
+            </a:prstGeom>
+            <a:ln w="38100">
+              <a:solidFill>
+                <a:schemeClr val="tx1"/>
+              </a:solidFill>
+              <a:prstDash val="sysDot"/>
+              <a:tailEnd type="triangle"/>
+            </a:ln>
+          </p:spPr>
+          <p:style>
+            <a:lnRef idx="1">
+              <a:schemeClr val="dk1"/>
+            </a:lnRef>
+            <a:fillRef idx="0">
+              <a:schemeClr val="dk1"/>
+            </a:fillRef>
+            <a:effectRef idx="0">
+              <a:schemeClr val="dk1"/>
+            </a:effectRef>
+            <a:fontRef idx="minor">
+              <a:schemeClr val="tx1"/>
+            </a:fontRef>
+          </p:style>
+        </p:cxnSp>
+        <p:cxnSp>
+          <p:nvCxnSpPr>
+            <p:cNvPr id="87" name="Straight Arrow Connector 86">
+              <a:extLst>
+                <a:ext uri="{FF2B5EF4-FFF2-40B4-BE49-F238E27FC236}">
+                  <a16:creationId xmlns:a16="http://schemas.microsoft.com/office/drawing/2014/main" id="{F3D32998-DB86-329E-F4F2-99824CC384F4}"/>
+                </a:ext>
+              </a:extLst>
+            </p:cNvPr>
+            <p:cNvCxnSpPr>
+              <a:cxnSpLocks/>
+              <a:stCxn id="63" idx="3"/>
+            </p:cNvCxnSpPr>
+            <p:nvPr/>
+          </p:nvCxnSpPr>
+          <p:spPr>
+            <a:xfrm flipV="1">
+              <a:off x="2835887" y="5167059"/>
+              <a:ext cx="3190946" cy="554397"/>
+            </a:xfrm>
+            <a:prstGeom prst="straightConnector1">
+              <a:avLst/>
+            </a:prstGeom>
+            <a:ln w="38100">
+              <a:solidFill>
+                <a:schemeClr val="tx1"/>
+              </a:solidFill>
+              <a:prstDash val="sysDot"/>
+              <a:tailEnd type="triangle"/>
+            </a:ln>
+          </p:spPr>
+          <p:style>
+            <a:lnRef idx="1">
+              <a:schemeClr val="dk1"/>
+            </a:lnRef>
+            <a:fillRef idx="0">
+              <a:schemeClr val="dk1"/>
+            </a:fillRef>
+            <a:effectRef idx="0">
+              <a:schemeClr val="dk1"/>
+            </a:effectRef>
+            <a:fontRef idx="minor">
+              <a:schemeClr val="tx1"/>
+            </a:fontRef>
+          </p:style>
+        </p:cxnSp>
+        <p:cxnSp>
+          <p:nvCxnSpPr>
+            <p:cNvPr id="94" name="Straight Arrow Connector 93">
+              <a:extLst>
+                <a:ext uri="{FF2B5EF4-FFF2-40B4-BE49-F238E27FC236}">
+                  <a16:creationId xmlns:a16="http://schemas.microsoft.com/office/drawing/2014/main" id="{0EF465A6-D185-0ABF-FD7B-54E5FCD01785}"/>
+                </a:ext>
+              </a:extLst>
+            </p:cNvPr>
+            <p:cNvCxnSpPr>
+              <a:cxnSpLocks/>
+              <a:stCxn id="63" idx="3"/>
+            </p:cNvCxnSpPr>
+            <p:nvPr/>
+          </p:nvCxnSpPr>
+          <p:spPr>
+            <a:xfrm flipV="1">
+              <a:off x="2835887" y="5167059"/>
+              <a:ext cx="5796049" cy="554397"/>
+            </a:xfrm>
+            <a:prstGeom prst="straightConnector1">
+              <a:avLst/>
+            </a:prstGeom>
+            <a:ln w="38100">
+              <a:solidFill>
+                <a:schemeClr val="tx1"/>
+              </a:solidFill>
+              <a:prstDash val="sysDot"/>
+              <a:tailEnd type="triangle"/>
+            </a:ln>
+          </p:spPr>
+          <p:style>
+            <a:lnRef idx="1">
+              <a:schemeClr val="dk1"/>
+            </a:lnRef>
+            <a:fillRef idx="0">
+              <a:schemeClr val="dk1"/>
+            </a:fillRef>
+            <a:effectRef idx="0">
+              <a:schemeClr val="dk1"/>
+            </a:effectRef>
+            <a:fontRef idx="minor">
+              <a:schemeClr val="tx1"/>
+            </a:fontRef>
+          </p:style>
+        </p:cxnSp>
+        <p:cxnSp>
+          <p:nvCxnSpPr>
+            <p:cNvPr id="98" name="Straight Arrow Connector 97">
+              <a:extLst>
+                <a:ext uri="{FF2B5EF4-FFF2-40B4-BE49-F238E27FC236}">
+                  <a16:creationId xmlns:a16="http://schemas.microsoft.com/office/drawing/2014/main" id="{116809DE-C0A4-BAA3-84B0-485362584CF7}"/>
+                </a:ext>
+              </a:extLst>
+            </p:cNvPr>
+            <p:cNvCxnSpPr>
+              <a:cxnSpLocks/>
+              <a:stCxn id="66" idx="3"/>
+            </p:cNvCxnSpPr>
+            <p:nvPr/>
+          </p:nvCxnSpPr>
+          <p:spPr>
+            <a:xfrm flipV="1">
+              <a:off x="2835887" y="5901455"/>
+              <a:ext cx="1237177" cy="1948362"/>
+            </a:xfrm>
+            <a:prstGeom prst="straightConnector1">
+              <a:avLst/>
+            </a:prstGeom>
+            <a:ln w="38100">
+              <a:solidFill>
+                <a:schemeClr val="tx1"/>
+              </a:solidFill>
+              <a:prstDash val="sysDot"/>
+              <a:tailEnd type="triangle"/>
+            </a:ln>
+          </p:spPr>
+          <p:style>
+            <a:lnRef idx="1">
+              <a:schemeClr val="dk1"/>
+            </a:lnRef>
+            <a:fillRef idx="0">
+              <a:schemeClr val="dk1"/>
+            </a:fillRef>
+            <a:effectRef idx="0">
+              <a:schemeClr val="dk1"/>
+            </a:effectRef>
+            <a:fontRef idx="minor">
+              <a:schemeClr val="tx1"/>
+            </a:fontRef>
+          </p:style>
+        </p:cxnSp>
+        <p:cxnSp>
+          <p:nvCxnSpPr>
+            <p:cNvPr id="100" name="Straight Arrow Connector 99">
+              <a:extLst>
+                <a:ext uri="{FF2B5EF4-FFF2-40B4-BE49-F238E27FC236}">
+                  <a16:creationId xmlns:a16="http://schemas.microsoft.com/office/drawing/2014/main" id="{316B7960-80E5-4E50-F45B-A1E2DB3BB47C}"/>
+                </a:ext>
+              </a:extLst>
+            </p:cNvPr>
+            <p:cNvCxnSpPr>
+              <a:cxnSpLocks/>
+              <a:stCxn id="66" idx="3"/>
+            </p:cNvCxnSpPr>
+            <p:nvPr/>
+          </p:nvCxnSpPr>
+          <p:spPr>
+            <a:xfrm flipV="1">
+              <a:off x="2835887" y="5593030"/>
+              <a:ext cx="3239999" cy="2256787"/>
+            </a:xfrm>
+            <a:prstGeom prst="straightConnector1">
+              <a:avLst/>
+            </a:prstGeom>
+            <a:ln w="38100">
+              <a:solidFill>
+                <a:schemeClr val="tx1"/>
+              </a:solidFill>
+              <a:prstDash val="sysDot"/>
+              <a:tailEnd type="triangle"/>
+            </a:ln>
+          </p:spPr>
+          <p:style>
+            <a:lnRef idx="1">
+              <a:schemeClr val="dk1"/>
+            </a:lnRef>
+            <a:fillRef idx="0">
+              <a:schemeClr val="dk1"/>
+            </a:fillRef>
+            <a:effectRef idx="0">
+              <a:schemeClr val="dk1"/>
+            </a:effectRef>
+            <a:fontRef idx="minor">
+              <a:schemeClr val="tx1"/>
+            </a:fontRef>
+          </p:style>
+        </p:cxnSp>
+        <p:cxnSp>
+          <p:nvCxnSpPr>
+            <p:cNvPr id="103" name="Straight Arrow Connector 102">
+              <a:extLst>
+                <a:ext uri="{FF2B5EF4-FFF2-40B4-BE49-F238E27FC236}">
+                  <a16:creationId xmlns:a16="http://schemas.microsoft.com/office/drawing/2014/main" id="{796E0F32-FDBD-5F09-3392-029D49EB2EE1}"/>
+                </a:ext>
+              </a:extLst>
+            </p:cNvPr>
+            <p:cNvCxnSpPr>
+              <a:cxnSpLocks/>
+              <a:stCxn id="66" idx="3"/>
+            </p:cNvCxnSpPr>
+            <p:nvPr/>
+          </p:nvCxnSpPr>
+          <p:spPr>
+            <a:xfrm flipV="1">
+              <a:off x="2835887" y="5444257"/>
+              <a:ext cx="5594881" cy="2405560"/>
+            </a:xfrm>
+            <a:prstGeom prst="straightConnector1">
+              <a:avLst/>
+            </a:prstGeom>
+            <a:ln w="38100">
+              <a:solidFill>
+                <a:schemeClr val="tx1"/>
+              </a:solidFill>
+              <a:prstDash val="sysDot"/>
+              <a:tailEnd type="triangle"/>
+            </a:ln>
+          </p:spPr>
+          <p:style>
+            <a:lnRef idx="1">
+              <a:schemeClr val="dk1"/>
+            </a:lnRef>
+            <a:fillRef idx="0">
+              <a:schemeClr val="dk1"/>
+            </a:fillRef>
+            <a:effectRef idx="0">
+              <a:schemeClr val="dk1"/>
+            </a:effectRef>
+            <a:fontRef idx="minor">
+              <a:schemeClr val="tx1"/>
+            </a:fontRef>
+          </p:style>
+        </p:cxnSp>
+        <p:cxnSp>
+          <p:nvCxnSpPr>
+            <p:cNvPr id="106" name="Straight Arrow Connector 105">
+              <a:extLst>
+                <a:ext uri="{FF2B5EF4-FFF2-40B4-BE49-F238E27FC236}">
+                  <a16:creationId xmlns:a16="http://schemas.microsoft.com/office/drawing/2014/main" id="{90F20272-B297-D490-0477-76E421561377}"/>
+                </a:ext>
+              </a:extLst>
+            </p:cNvPr>
+            <p:cNvCxnSpPr>
+              <a:cxnSpLocks/>
+            </p:cNvCxnSpPr>
+            <p:nvPr/>
+          </p:nvCxnSpPr>
+          <p:spPr>
+            <a:xfrm flipH="1">
+              <a:off x="5512200" y="5961836"/>
+              <a:ext cx="3754632" cy="1444804"/>
+            </a:xfrm>
+            <a:prstGeom prst="straightConnector1">
+              <a:avLst/>
+            </a:prstGeom>
+            <a:ln w="38100">
+              <a:solidFill>
+                <a:schemeClr val="tx1"/>
+              </a:solidFill>
+              <a:prstDash val="sysDot"/>
+              <a:tailEnd type="triangle"/>
+            </a:ln>
+          </p:spPr>
+          <p:style>
+            <a:lnRef idx="1">
+              <a:schemeClr val="dk1"/>
+            </a:lnRef>
+            <a:fillRef idx="0">
+              <a:schemeClr val="dk1"/>
+            </a:fillRef>
+            <a:effectRef idx="0">
+              <a:schemeClr val="dk1"/>
+            </a:effectRef>
+            <a:fontRef idx="minor">
+              <a:schemeClr val="tx1"/>
+            </a:fontRef>
+          </p:style>
+        </p:cxnSp>
+        <p:cxnSp>
+          <p:nvCxnSpPr>
+            <p:cNvPr id="112" name="Straight Arrow Connector 111">
+              <a:extLst>
+                <a:ext uri="{FF2B5EF4-FFF2-40B4-BE49-F238E27FC236}">
+                  <a16:creationId xmlns:a16="http://schemas.microsoft.com/office/drawing/2014/main" id="{41CC2BEC-7EFC-E822-B0E8-04E88A057685}"/>
+                </a:ext>
+              </a:extLst>
+            </p:cNvPr>
+            <p:cNvCxnSpPr>
+              <a:cxnSpLocks/>
+              <a:stCxn id="20" idx="1"/>
+            </p:cNvCxnSpPr>
+            <p:nvPr/>
+          </p:nvCxnSpPr>
+          <p:spPr>
+            <a:xfrm flipH="1">
+              <a:off x="6179184" y="5978589"/>
+              <a:ext cx="3156815" cy="897047"/>
+            </a:xfrm>
+            <a:prstGeom prst="straightConnector1">
+              <a:avLst/>
+            </a:prstGeom>
+            <a:ln w="38100">
+              <a:solidFill>
+                <a:schemeClr val="tx1"/>
+              </a:solidFill>
+              <a:prstDash val="sysDot"/>
+              <a:tailEnd type="triangle"/>
+            </a:ln>
+          </p:spPr>
+          <p:style>
+            <a:lnRef idx="1">
+              <a:schemeClr val="dk1"/>
+            </a:lnRef>
+            <a:fillRef idx="0">
+              <a:schemeClr val="dk1"/>
+            </a:fillRef>
+            <a:effectRef idx="0">
+              <a:schemeClr val="dk1"/>
+            </a:effectRef>
+            <a:fontRef idx="minor">
+              <a:schemeClr val="tx1"/>
+            </a:fontRef>
+          </p:style>
+        </p:cxnSp>
+        <p:cxnSp>
+          <p:nvCxnSpPr>
+            <p:cNvPr id="116" name="Straight Arrow Connector 115">
+              <a:extLst>
+                <a:ext uri="{FF2B5EF4-FFF2-40B4-BE49-F238E27FC236}">
+                  <a16:creationId xmlns:a16="http://schemas.microsoft.com/office/drawing/2014/main" id="{FE583131-07AE-8561-88F5-29ACB8D59FC8}"/>
+                </a:ext>
+              </a:extLst>
+            </p:cNvPr>
+            <p:cNvCxnSpPr>
+              <a:cxnSpLocks/>
+              <a:stCxn id="20" idx="1"/>
+            </p:cNvCxnSpPr>
+            <p:nvPr/>
+          </p:nvCxnSpPr>
+          <p:spPr>
+            <a:xfrm flipH="1" flipV="1">
+              <a:off x="8098821" y="5947661"/>
+              <a:ext cx="1237178" cy="30928"/>
+            </a:xfrm>
+            <a:prstGeom prst="straightConnector1">
+              <a:avLst/>
+            </a:prstGeom>
+            <a:ln w="38100">
+              <a:solidFill>
+                <a:schemeClr val="tx1"/>
+              </a:solidFill>
+              <a:prstDash val="sysDot"/>
+              <a:tailEnd type="triangle"/>
+            </a:ln>
+          </p:spPr>
+          <p:style>
+            <a:lnRef idx="1">
+              <a:schemeClr val="dk1"/>
+            </a:lnRef>
+            <a:fillRef idx="0">
+              <a:schemeClr val="dk1"/>
+            </a:fillRef>
+            <a:effectRef idx="0">
+              <a:schemeClr val="dk1"/>
+            </a:effectRef>
+            <a:fontRef idx="minor">
+              <a:schemeClr val="tx1"/>
+            </a:fontRef>
+          </p:style>
+        </p:cxnSp>
+        <p:cxnSp>
+          <p:nvCxnSpPr>
+            <p:cNvPr id="119" name="Straight Arrow Connector 118">
+              <a:extLst>
+                <a:ext uri="{FF2B5EF4-FFF2-40B4-BE49-F238E27FC236}">
+                  <a16:creationId xmlns:a16="http://schemas.microsoft.com/office/drawing/2014/main" id="{D3446EE0-B893-21FC-F757-24C02A6D30B9}"/>
+                </a:ext>
+              </a:extLst>
+            </p:cNvPr>
+            <p:cNvCxnSpPr>
+              <a:cxnSpLocks/>
+              <a:stCxn id="67" idx="1"/>
+            </p:cNvCxnSpPr>
+            <p:nvPr/>
+          </p:nvCxnSpPr>
+          <p:spPr>
+            <a:xfrm flipH="1" flipV="1">
+              <a:off x="7254222" y="6956197"/>
+              <a:ext cx="962391" cy="1387819"/>
+            </a:xfrm>
+            <a:prstGeom prst="straightConnector1">
+              <a:avLst/>
+            </a:prstGeom>
+            <a:ln w="38100">
+              <a:solidFill>
+                <a:schemeClr val="tx1"/>
+              </a:solidFill>
+              <a:prstDash val="sysDot"/>
+              <a:tailEnd type="triangle"/>
+            </a:ln>
+          </p:spPr>
+          <p:style>
+            <a:lnRef idx="1">
+              <a:schemeClr val="dk1"/>
+            </a:lnRef>
+            <a:fillRef idx="0">
+              <a:schemeClr val="dk1"/>
+            </a:fillRef>
+            <a:effectRef idx="0">
+              <a:schemeClr val="dk1"/>
+            </a:effectRef>
+            <a:fontRef idx="minor">
+              <a:schemeClr val="tx1"/>
+            </a:fontRef>
+          </p:style>
+        </p:cxnSp>
+        <p:cxnSp>
+          <p:nvCxnSpPr>
+            <p:cNvPr id="122" name="Straight Arrow Connector 121">
+              <a:extLst>
+                <a:ext uri="{FF2B5EF4-FFF2-40B4-BE49-F238E27FC236}">
+                  <a16:creationId xmlns:a16="http://schemas.microsoft.com/office/drawing/2014/main" id="{4752635D-99CC-0DA2-201C-1D80B89FE73A}"/>
+                </a:ext>
+              </a:extLst>
+            </p:cNvPr>
+            <p:cNvCxnSpPr>
+              <a:cxnSpLocks/>
+              <a:stCxn id="67" idx="1"/>
+            </p:cNvCxnSpPr>
+            <p:nvPr/>
+          </p:nvCxnSpPr>
+          <p:spPr>
+            <a:xfrm flipH="1" flipV="1">
+              <a:off x="6186340" y="7406640"/>
+              <a:ext cx="2030273" cy="937376"/>
+            </a:xfrm>
+            <a:prstGeom prst="straightConnector1">
+              <a:avLst/>
+            </a:prstGeom>
+            <a:ln w="38100">
+              <a:solidFill>
+                <a:schemeClr val="tx1"/>
+              </a:solidFill>
+              <a:prstDash val="sysDot"/>
+              <a:tailEnd type="triangle"/>
+            </a:ln>
+          </p:spPr>
+          <p:style>
+            <a:lnRef idx="1">
+              <a:schemeClr val="dk1"/>
+            </a:lnRef>
+            <a:fillRef idx="0">
+              <a:schemeClr val="dk1"/>
+            </a:fillRef>
+            <a:effectRef idx="0">
+              <a:schemeClr val="dk1"/>
+            </a:effectRef>
+            <a:fontRef idx="minor">
+              <a:schemeClr val="tx1"/>
+            </a:fontRef>
+          </p:style>
+        </p:cxnSp>
+        <p:cxnSp>
+          <p:nvCxnSpPr>
+            <p:cNvPr id="125" name="Straight Arrow Connector 124">
+              <a:extLst>
+                <a:ext uri="{FF2B5EF4-FFF2-40B4-BE49-F238E27FC236}">
+                  <a16:creationId xmlns:a16="http://schemas.microsoft.com/office/drawing/2014/main" id="{EE971DF6-DD86-64B9-E2FB-4516627F595B}"/>
+                </a:ext>
+              </a:extLst>
+            </p:cNvPr>
+            <p:cNvCxnSpPr>
+              <a:cxnSpLocks/>
+              <a:stCxn id="67" idx="1"/>
+            </p:cNvCxnSpPr>
+            <p:nvPr/>
+          </p:nvCxnSpPr>
+          <p:spPr>
+            <a:xfrm flipH="1" flipV="1">
+              <a:off x="5733911" y="7768869"/>
+              <a:ext cx="2482702" cy="575147"/>
+            </a:xfrm>
+            <a:prstGeom prst="straightConnector1">
+              <a:avLst/>
+            </a:prstGeom>
+            <a:ln w="38100">
+              <a:solidFill>
+                <a:schemeClr val="tx1"/>
+              </a:solidFill>
+              <a:prstDash val="sysDot"/>
+              <a:tailEnd type="triangle"/>
+            </a:ln>
+          </p:spPr>
+          <p:style>
+            <a:lnRef idx="1">
+              <a:schemeClr val="dk1"/>
+            </a:lnRef>
+            <a:fillRef idx="0">
+              <a:schemeClr val="dk1"/>
+            </a:fillRef>
+            <a:effectRef idx="0">
+              <a:schemeClr val="dk1"/>
+            </a:effectRef>
+            <a:fontRef idx="minor">
+              <a:schemeClr val="tx1"/>
+            </a:fontRef>
+          </p:style>
+        </p:cxnSp>
+        <p:cxnSp>
+          <p:nvCxnSpPr>
+            <p:cNvPr id="128" name="Straight Arrow Connector 127">
+              <a:extLst>
+                <a:ext uri="{FF2B5EF4-FFF2-40B4-BE49-F238E27FC236}">
+                  <a16:creationId xmlns:a16="http://schemas.microsoft.com/office/drawing/2014/main" id="{D9157542-5D2D-A5DC-6DCE-7153D033D9AF}"/>
+                </a:ext>
+              </a:extLst>
+            </p:cNvPr>
+            <p:cNvCxnSpPr>
+              <a:cxnSpLocks/>
+            </p:cNvCxnSpPr>
+            <p:nvPr/>
+          </p:nvCxnSpPr>
+          <p:spPr>
+            <a:xfrm flipH="1">
+              <a:off x="7040880" y="9922827"/>
+              <a:ext cx="3419902" cy="7557"/>
+            </a:xfrm>
+            <a:prstGeom prst="straightConnector1">
+              <a:avLst/>
+            </a:prstGeom>
+            <a:ln w="38100">
+              <a:solidFill>
+                <a:schemeClr val="tx1"/>
+              </a:solidFill>
+              <a:tailEnd type="triangle"/>
+            </a:ln>
+          </p:spPr>
+          <p:style>
+            <a:lnRef idx="1">
+              <a:schemeClr val="dk1"/>
+            </a:lnRef>
+            <a:fillRef idx="0">
+              <a:schemeClr val="dk1"/>
+            </a:fillRef>
+            <a:effectRef idx="0">
+              <a:schemeClr val="dk1"/>
+            </a:effectRef>
+            <a:fontRef idx="minor">
+              <a:schemeClr val="tx1"/>
+            </a:fontRef>
+          </p:style>
+        </p:cxnSp>
+        <p:cxnSp>
+          <p:nvCxnSpPr>
+            <p:cNvPr id="129" name="Straight Connector 128">
+              <a:extLst>
+                <a:ext uri="{FF2B5EF4-FFF2-40B4-BE49-F238E27FC236}">
+                  <a16:creationId xmlns:a16="http://schemas.microsoft.com/office/drawing/2014/main" id="{97E8E3FB-A9F8-9A8E-51E6-8A2AA815F02D}"/>
+                </a:ext>
+              </a:extLst>
+            </p:cNvPr>
+            <p:cNvCxnSpPr>
+              <a:cxnSpLocks/>
+              <a:stCxn id="20" idx="2"/>
+            </p:cNvCxnSpPr>
+            <p:nvPr/>
+          </p:nvCxnSpPr>
+          <p:spPr>
+            <a:xfrm>
+              <a:off x="10469855" y="7200106"/>
+              <a:ext cx="9215" cy="2730278"/>
+            </a:xfrm>
+            <a:prstGeom prst="line">
+              <a:avLst/>
+            </a:prstGeom>
+            <a:ln w="38100">
+              <a:solidFill>
+                <a:schemeClr val="tx1"/>
+              </a:solidFill>
+            </a:ln>
+          </p:spPr>
+          <p:style>
+            <a:lnRef idx="1">
+              <a:schemeClr val="accent1"/>
+            </a:lnRef>
+            <a:fillRef idx="0">
+              <a:schemeClr val="accent1"/>
+            </a:fillRef>
+            <a:effectRef idx="0">
+              <a:schemeClr val="accent1"/>
+            </a:effectRef>
+            <a:fontRef idx="minor">
+              <a:schemeClr val="tx1"/>
+            </a:fontRef>
+          </p:style>
+        </p:cxnSp>
+        <p:cxnSp>
+          <p:nvCxnSpPr>
+            <p:cNvPr id="144" name="Straight Connector 143">
+              <a:extLst>
+                <a:ext uri="{FF2B5EF4-FFF2-40B4-BE49-F238E27FC236}">
+                  <a16:creationId xmlns:a16="http://schemas.microsoft.com/office/drawing/2014/main" id="{FF719D8F-AE30-086A-60E8-C2C3D34295B0}"/>
+                </a:ext>
+              </a:extLst>
+            </p:cNvPr>
+            <p:cNvCxnSpPr>
+              <a:cxnSpLocks/>
+            </p:cNvCxnSpPr>
+            <p:nvPr/>
+          </p:nvCxnSpPr>
+          <p:spPr>
+            <a:xfrm>
+              <a:off x="9169120" y="9244016"/>
+              <a:ext cx="0" cy="430336"/>
+            </a:xfrm>
+            <a:prstGeom prst="line">
+              <a:avLst/>
+            </a:prstGeom>
+            <a:ln w="38100">
+              <a:solidFill>
+                <a:schemeClr val="tx1"/>
+              </a:solidFill>
+            </a:ln>
+          </p:spPr>
+          <p:style>
+            <a:lnRef idx="1">
+              <a:schemeClr val="accent1"/>
+            </a:lnRef>
+            <a:fillRef idx="0">
+              <a:schemeClr val="accent1"/>
+            </a:fillRef>
+            <a:effectRef idx="0">
+              <a:schemeClr val="accent1"/>
+            </a:effectRef>
+            <a:fontRef idx="minor">
+              <a:schemeClr val="tx1"/>
+            </a:fontRef>
+          </p:style>
+        </p:cxnSp>
+        <p:cxnSp>
+          <p:nvCxnSpPr>
+            <p:cNvPr id="148" name="Straight Arrow Connector 147">
+              <a:extLst>
+                <a:ext uri="{FF2B5EF4-FFF2-40B4-BE49-F238E27FC236}">
+                  <a16:creationId xmlns:a16="http://schemas.microsoft.com/office/drawing/2014/main" id="{54B952B6-4135-93C8-1BD7-32EE085047A4}"/>
+                </a:ext>
+              </a:extLst>
+            </p:cNvPr>
+            <p:cNvCxnSpPr>
+              <a:cxnSpLocks/>
+            </p:cNvCxnSpPr>
+            <p:nvPr/>
+          </p:nvCxnSpPr>
+          <p:spPr>
+            <a:xfrm flipH="1">
+              <a:off x="7175999" y="9661429"/>
+              <a:ext cx="1993121" cy="0"/>
+            </a:xfrm>
+            <a:prstGeom prst="straightConnector1">
+              <a:avLst/>
+            </a:prstGeom>
+            <a:ln w="38100">
+              <a:solidFill>
+                <a:schemeClr val="tx1"/>
+              </a:solidFill>
+              <a:tailEnd type="triangle"/>
+            </a:ln>
+          </p:spPr>
+          <p:style>
+            <a:lnRef idx="1">
+              <a:schemeClr val="dk1"/>
+            </a:lnRef>
+            <a:fillRef idx="0">
+              <a:schemeClr val="dk1"/>
+            </a:fillRef>
+            <a:effectRef idx="0">
+              <a:schemeClr val="dk1"/>
+            </a:effectRef>
+            <a:fontRef idx="minor">
+              <a:schemeClr val="tx1"/>
+            </a:fontRef>
+          </p:style>
+        </p:cxnSp>
       </p:grpSp>
     </p:spTree>
     <p:extLst>

</xml_diff>